<commit_message>
Added Custom Dashboard functionality
</commit_message>
<xml_diff>
--- a/documents/Breast Cancer Detection PPT.pptx
+++ b/documents/Breast Cancer Detection PPT.pptx
@@ -11,24 +11,23 @@
     <p:sldId id="274" r:id="rId5"/>
     <p:sldId id="277" r:id="rId6"/>
     <p:sldId id="287" r:id="rId7"/>
-    <p:sldId id="301" r:id="rId8"/>
-    <p:sldId id="257" r:id="rId9"/>
-    <p:sldId id="261" r:id="rId10"/>
-    <p:sldId id="294" r:id="rId11"/>
-    <p:sldId id="295" r:id="rId12"/>
-    <p:sldId id="272" r:id="rId13"/>
-    <p:sldId id="300" r:id="rId14"/>
-    <p:sldId id="296" r:id="rId15"/>
-    <p:sldId id="297" r:id="rId16"/>
-    <p:sldId id="298" r:id="rId17"/>
-    <p:sldId id="299" r:id="rId18"/>
-    <p:sldId id="281" r:id="rId19"/>
-    <p:sldId id="282" r:id="rId20"/>
-    <p:sldId id="288" r:id="rId21"/>
-    <p:sldId id="289" r:id="rId22"/>
-    <p:sldId id="292" r:id="rId23"/>
-    <p:sldId id="291" r:id="rId24"/>
-    <p:sldId id="273" r:id="rId25"/>
+    <p:sldId id="257" r:id="rId8"/>
+    <p:sldId id="261" r:id="rId9"/>
+    <p:sldId id="294" r:id="rId10"/>
+    <p:sldId id="295" r:id="rId11"/>
+    <p:sldId id="272" r:id="rId12"/>
+    <p:sldId id="300" r:id="rId13"/>
+    <p:sldId id="296" r:id="rId14"/>
+    <p:sldId id="297" r:id="rId15"/>
+    <p:sldId id="298" r:id="rId16"/>
+    <p:sldId id="299" r:id="rId17"/>
+    <p:sldId id="281" r:id="rId18"/>
+    <p:sldId id="282" r:id="rId19"/>
+    <p:sldId id="288" r:id="rId20"/>
+    <p:sldId id="289" r:id="rId21"/>
+    <p:sldId id="292" r:id="rId22"/>
+    <p:sldId id="291" r:id="rId23"/>
+    <p:sldId id="273" r:id="rId24"/>
   </p:sldIdLst>
   <p:sldSz cx="12192000" cy="6858000"/>
   <p:notesSz cx="12192000" cy="6858000"/>
@@ -129,7 +128,7 @@
   </p:defaultTextStyle>
   <p:extLst>
     <p:ext uri="{EFAFB233-063F-42B5-8137-9DF3F51BA10A}">
-      <p15:sldGuideLst xmlns:p15="http://schemas.microsoft.com/office/powerpoint/2012/main" xmlns="">
+      <p15:sldGuideLst xmlns="" xmlns:p15="http://schemas.microsoft.com/office/powerpoint/2012/main">
         <p15:guide id="1" orient="horz" pos="2880">
           <p15:clr>
             <a:srgbClr val="A4A3A4"/>
@@ -15001,200 +15000,6 @@
         </p:nvSpPr>
         <p:spPr>
           <a:xfrm>
-            <a:off x="1523968" y="0"/>
-            <a:ext cx="8986011" cy="1077218"/>
-          </a:xfrm>
-        </p:spPr>
-        <p:txBody>
-          <a:bodyPr/>
-          <a:lstStyle/>
-          <a:p>
-            <a:pPr algn="ctr"/>
-            <a:r>
-              <a:rPr lang="en-GB" sz="3600" u="sng" spc="-5" dirty="0">
-                <a:latin typeface="+mn-lt"/>
-              </a:rPr>
-              <a:t>Classification Algorithms used for this problem</a:t>
-            </a:r>
-            <a:br>
-              <a:rPr lang="en-GB" sz="3600" u="sng" spc="-5" dirty="0">
-                <a:latin typeface="+mn-lt"/>
-              </a:rPr>
-            </a:br>
-            <a:endParaRPr lang="en-GB" dirty="0">
-              <a:latin typeface="+mn-lt"/>
-            </a:endParaRPr>
-          </a:p>
-        </p:txBody>
-      </p:sp>
-      <p:sp>
-        <p:nvSpPr>
-          <p:cNvPr id="5" name="object 5"/>
-          <p:cNvSpPr txBox="1">
-            <a:spLocks noGrp="1"/>
-          </p:cNvSpPr>
-          <p:nvPr>
-            <p:ph type="ftr" sz="quarter" idx="5"/>
-          </p:nvPr>
-        </p:nvSpPr>
-        <p:spPr>
-          <a:xfrm>
-            <a:off x="1601469" y="6620937"/>
-            <a:ext cx="1671954" cy="189796"/>
-          </a:xfrm>
-          <a:prstGeom prst="rect">
-            <a:avLst/>
-          </a:prstGeom>
-        </p:spPr>
-        <p:txBody>
-          <a:bodyPr vert="horz" wrap="square" lIns="0" tIns="5080" rIns="0" bIns="0" rtlCol="0">
-            <a:spAutoFit/>
-          </a:bodyPr>
-          <a:lstStyle/>
-          <a:p>
-            <a:pPr marL="12700">
-              <a:lnSpc>
-                <a:spcPct val="100000"/>
-              </a:lnSpc>
-              <a:spcBef>
-                <a:spcPts val="40"/>
-              </a:spcBef>
-            </a:pPr>
-            <a:r>
-              <a:rPr lang="en-GB" spc="-5" dirty="0" err="1">
-                <a:latin typeface="+mn-lt"/>
-              </a:rPr>
-              <a:t>Hemant</a:t>
-            </a:r>
-            <a:r>
-              <a:rPr lang="en-GB" spc="-5" dirty="0">
-                <a:latin typeface="+mn-lt"/>
-              </a:rPr>
-              <a:t> &amp; Jane</a:t>
-            </a:r>
-          </a:p>
-        </p:txBody>
-      </p:sp>
-      <p:sp>
-        <p:nvSpPr>
-          <p:cNvPr id="6" name="object 45"/>
-          <p:cNvSpPr txBox="1">
-            <a:spLocks noGrp="1"/>
-          </p:cNvSpPr>
-          <p:nvPr>
-            <p:ph type="sldNum" sz="quarter" idx="7"/>
-          </p:nvPr>
-        </p:nvSpPr>
-        <p:spPr>
-          <a:xfrm>
-            <a:off x="10367518" y="6620937"/>
-            <a:ext cx="244475" cy="204470"/>
-          </a:xfrm>
-          <a:prstGeom prst="rect">
-            <a:avLst/>
-          </a:prstGeom>
-        </p:spPr>
-        <p:txBody>
-          <a:bodyPr vert="horz" wrap="square" lIns="0" tIns="5080" rIns="0" bIns="0" rtlCol="0">
-            <a:spAutoFit/>
-          </a:bodyPr>
-          <a:lstStyle/>
-          <a:p>
-            <a:pPr marL="38100">
-              <a:lnSpc>
-                <a:spcPct val="100000"/>
-              </a:lnSpc>
-              <a:spcBef>
-                <a:spcPts val="40"/>
-              </a:spcBef>
-            </a:pPr>
-            <a:fld id="{81D60167-4931-47E6-BA6A-407CBD079E47}" type="slidenum">
-              <a:rPr spc="-5" dirty="0"/>
-              <a:pPr marL="38100">
-                <a:lnSpc>
-                  <a:spcPct val="100000"/>
-                </a:lnSpc>
-                <a:spcBef>
-                  <a:spcPts val="40"/>
-                </a:spcBef>
-              </a:pPr>
-              <a:t>10</a:t>
-            </a:fld>
-            <a:endParaRPr spc="-5" dirty="0"/>
-          </a:p>
-        </p:txBody>
-      </p:sp>
-      <p:pic>
-        <p:nvPicPr>
-          <p:cNvPr id="7" name="Picture 6" descr="Architecture.jpeg"/>
-          <p:cNvPicPr>
-            <a:picLocks noChangeAspect="1"/>
-          </p:cNvPicPr>
-          <p:nvPr/>
-        </p:nvPicPr>
-        <p:blipFill>
-          <a:blip r:embed="rId2"/>
-          <a:stretch>
-            <a:fillRect/>
-          </a:stretch>
-        </p:blipFill>
-        <p:spPr>
-          <a:xfrm>
-            <a:off x="1309654" y="571480"/>
-            <a:ext cx="9286940" cy="6072230"/>
-          </a:xfrm>
-          <a:prstGeom prst="rect">
-            <a:avLst/>
-          </a:prstGeom>
-        </p:spPr>
-      </p:pic>
-    </p:spTree>
-  </p:cSld>
-  <p:clrMapOvr>
-    <a:masterClrMapping/>
-  </p:clrMapOvr>
-  <p:transition spd="med">
-    <p:comb/>
-  </p:transition>
-  <p:timing>
-    <p:tnLst>
-      <p:par>
-        <p:cTn id="1" dur="indefinite" restart="never" nodeType="tmRoot"/>
-      </p:par>
-    </p:tnLst>
-  </p:timing>
-</p:sld>
-</file>
-
-<file path=ppt/slides/slide11.xml><?xml version="1.0" encoding="utf-8"?>
-<p:sld xmlns:a="http://schemas.openxmlformats.org/drawingml/2006/main" xmlns:r="http://schemas.openxmlformats.org/officeDocument/2006/relationships" xmlns:p="http://schemas.openxmlformats.org/presentationml/2006/main">
-  <p:cSld>
-    <p:spTree>
-      <p:nvGrpSpPr>
-        <p:cNvPr id="1" name=""/>
-        <p:cNvGrpSpPr/>
-        <p:nvPr/>
-      </p:nvGrpSpPr>
-      <p:grpSpPr>
-        <a:xfrm>
-          <a:off x="0" y="0"/>
-          <a:ext cx="0" cy="0"/>
-          <a:chOff x="0" y="0"/>
-          <a:chExt cx="0" cy="0"/>
-        </a:xfrm>
-      </p:grpSpPr>
-      <p:sp>
-        <p:nvSpPr>
-          <p:cNvPr id="2" name="Title 1"/>
-          <p:cNvSpPr>
-            <a:spLocks noGrp="1"/>
-          </p:cNvSpPr>
-          <p:nvPr>
-            <p:ph type="title"/>
-          </p:nvPr>
-        </p:nvSpPr>
-        <p:spPr>
-          <a:xfrm>
             <a:off x="1666844" y="0"/>
             <a:ext cx="8986011" cy="523220"/>
           </a:xfrm>
@@ -15639,7 +15444,7 @@
                   <a:spcPts val="40"/>
                 </a:spcBef>
               </a:pPr>
-              <a:t>11</a:t>
+              <a:t>10</a:t>
             </a:fld>
             <a:endParaRPr spc="-5" dirty="0"/>
           </a:p>
@@ -15663,7 +15468,7 @@
 </p:sld>
 </file>
 
-<file path=ppt/slides/slide12.xml><?xml version="1.0" encoding="utf-8"?>
+<file path=ppt/slides/slide11.xml><?xml version="1.0" encoding="utf-8"?>
 <p:sld xmlns:a="http://schemas.openxmlformats.org/drawingml/2006/main" xmlns:r="http://schemas.openxmlformats.org/officeDocument/2006/relationships" xmlns:p="http://schemas.openxmlformats.org/presentationml/2006/main" showMasterSp="0">
   <p:cSld>
     <p:spTree>
@@ -19448,7 +19253,7 @@
                   <a:spcPts val="40"/>
                 </a:spcBef>
               </a:pPr>
-              <a:t>12</a:t>
+              <a:t>11</a:t>
             </a:fld>
             <a:endParaRPr spc="-5" dirty="0"/>
           </a:p>
@@ -19679,7 +19484,7 @@
 </p:sld>
 </file>
 
-<file path=ppt/slides/slide13.xml><?xml version="1.0" encoding="utf-8"?>
+<file path=ppt/slides/slide12.xml><?xml version="1.0" encoding="utf-8"?>
 <p:sld xmlns:a="http://schemas.openxmlformats.org/drawingml/2006/main" xmlns:r="http://schemas.openxmlformats.org/officeDocument/2006/relationships" xmlns:p="http://schemas.openxmlformats.org/presentationml/2006/main">
   <p:cSld>
     <p:spTree>
@@ -19812,7 +19617,7 @@
                   <a:spcPts val="40"/>
                 </a:spcBef>
               </a:pPr>
-              <a:t>13</a:t>
+              <a:t>12</a:t>
             </a:fld>
             <a:endParaRPr spc="-5" dirty="0"/>
           </a:p>
@@ -19862,7 +19667,7 @@
 </p:sld>
 </file>
 
-<file path=ppt/slides/slide14.xml><?xml version="1.0" encoding="utf-8"?>
+<file path=ppt/slides/slide13.xml><?xml version="1.0" encoding="utf-8"?>
 <p:sld xmlns:a="http://schemas.openxmlformats.org/drawingml/2006/main" xmlns:r="http://schemas.openxmlformats.org/officeDocument/2006/relationships" xmlns:p="http://schemas.openxmlformats.org/presentationml/2006/main">
   <p:cSld>
     <p:spTree>
@@ -19884,7 +19689,7 @@
           <p:cNvPr id="6" name="Picture 5">
             <a:extLst>
               <a:ext uri="{FF2B5EF4-FFF2-40B4-BE49-F238E27FC236}">
-                <a16:creationId xmlns:a16="http://schemas.microsoft.com/office/drawing/2014/main" xmlns="" id="{C74E1773-7326-420E-A887-9FBB8498B5ED}"/>
+                <a16:creationId xmlns="" xmlns:a16="http://schemas.microsoft.com/office/drawing/2014/main" id="{C74E1773-7326-420E-A887-9FBB8498B5ED}"/>
               </a:ext>
             </a:extLst>
           </p:cNvPr>
@@ -19914,7 +19719,7 @@
           <p:cNvPr id="7" name="object 37">
             <a:extLst>
               <a:ext uri="{FF2B5EF4-FFF2-40B4-BE49-F238E27FC236}">
-                <a16:creationId xmlns:a16="http://schemas.microsoft.com/office/drawing/2014/main" xmlns="" id="{5EB14E87-6E91-4C91-B4BF-651842591A1E}"/>
+                <a16:creationId xmlns="" xmlns:a16="http://schemas.microsoft.com/office/drawing/2014/main" id="{5EB14E87-6E91-4C91-B4BF-651842591A1E}"/>
               </a:ext>
             </a:extLst>
           </p:cNvPr>
@@ -20044,7 +19849,7 @@
                   <a:spcPts val="40"/>
                 </a:spcBef>
               </a:pPr>
-              <a:t>14</a:t>
+              <a:t>13</a:t>
             </a:fld>
             <a:endParaRPr spc="-5" dirty="0"/>
           </a:p>
@@ -20053,7 +19858,7 @@
     </p:spTree>
     <p:extLst>
       <p:ext uri="{BB962C8B-B14F-4D97-AF65-F5344CB8AC3E}">
-        <p14:creationId xmlns:p14="http://schemas.microsoft.com/office/powerpoint/2010/main" xmlns="" val="2982831347"/>
+        <p14:creationId xmlns="" xmlns:p14="http://schemas.microsoft.com/office/powerpoint/2010/main" val="2982831347"/>
       </p:ext>
     </p:extLst>
   </p:cSld>
@@ -20062,6 +19867,217 @@
   </p:clrMapOvr>
   <p:transition spd="med">
     <p:wheel spokes="3"/>
+  </p:transition>
+  <p:timing>
+    <p:tnLst>
+      <p:par>
+        <p:cTn id="1" dur="indefinite" restart="never" nodeType="tmRoot"/>
+      </p:par>
+    </p:tnLst>
+  </p:timing>
+</p:sld>
+</file>
+
+<file path=ppt/slides/slide14.xml><?xml version="1.0" encoding="utf-8"?>
+<p:sld xmlns:a="http://schemas.openxmlformats.org/drawingml/2006/main" xmlns:r="http://schemas.openxmlformats.org/officeDocument/2006/relationships" xmlns:p="http://schemas.openxmlformats.org/presentationml/2006/main">
+  <p:cSld>
+    <p:spTree>
+      <p:nvGrpSpPr>
+        <p:cNvPr id="1" name=""/>
+        <p:cNvGrpSpPr/>
+        <p:nvPr/>
+      </p:nvGrpSpPr>
+      <p:grpSpPr>
+        <a:xfrm>
+          <a:off x="0" y="0"/>
+          <a:ext cx="0" cy="0"/>
+          <a:chOff x="0" y="0"/>
+          <a:chExt cx="0" cy="0"/>
+        </a:xfrm>
+      </p:grpSpPr>
+      <p:pic>
+        <p:nvPicPr>
+          <p:cNvPr id="2" name="Picture 1">
+            <a:extLst>
+              <a:ext uri="{FF2B5EF4-FFF2-40B4-BE49-F238E27FC236}">
+                <a16:creationId xmlns="" xmlns:a16="http://schemas.microsoft.com/office/drawing/2014/main" id="{F100583E-E620-4691-8152-6B63F1BCEA81}"/>
+              </a:ext>
+            </a:extLst>
+          </p:cNvPr>
+          <p:cNvPicPr>
+            <a:picLocks noChangeAspect="1"/>
+          </p:cNvPicPr>
+          <p:nvPr/>
+        </p:nvPicPr>
+        <p:blipFill>
+          <a:blip r:embed="rId2"/>
+          <a:stretch>
+            <a:fillRect/>
+          </a:stretch>
+        </p:blipFill>
+        <p:spPr>
+          <a:xfrm>
+            <a:off x="1043859" y="980728"/>
+            <a:ext cx="10095942" cy="5313224"/>
+          </a:xfrm>
+          <a:prstGeom prst="rect">
+            <a:avLst/>
+          </a:prstGeom>
+        </p:spPr>
+      </p:pic>
+      <p:sp>
+        <p:nvSpPr>
+          <p:cNvPr id="4" name="object 37">
+            <a:extLst>
+              <a:ext uri="{FF2B5EF4-FFF2-40B4-BE49-F238E27FC236}">
+                <a16:creationId xmlns="" xmlns:a16="http://schemas.microsoft.com/office/drawing/2014/main" id="{6436B395-45B5-4726-89B5-902F8FC1175C}"/>
+              </a:ext>
+            </a:extLst>
+          </p:cNvPr>
+          <p:cNvSpPr txBox="1">
+            <a:spLocks noGrp="1"/>
+          </p:cNvSpPr>
+          <p:nvPr>
+            <p:ph type="title"/>
+          </p:nvPr>
+        </p:nvSpPr>
+        <p:spPr>
+          <a:xfrm>
+            <a:off x="3359696" y="125914"/>
+            <a:ext cx="5029200" cy="536044"/>
+          </a:xfrm>
+          <a:prstGeom prst="rect">
+            <a:avLst/>
+          </a:prstGeom>
+        </p:spPr>
+        <p:txBody>
+          <a:bodyPr vert="horz" wrap="square" lIns="0" tIns="12700" rIns="0" bIns="0" rtlCol="0">
+            <a:spAutoFit/>
+          </a:bodyPr>
+          <a:lstStyle/>
+          <a:p>
+            <a:pPr marL="12700" algn="ctr">
+              <a:lnSpc>
+                <a:spcPct val="100000"/>
+              </a:lnSpc>
+              <a:spcBef>
+                <a:spcPts val="100"/>
+              </a:spcBef>
+            </a:pPr>
+            <a:r>
+              <a:rPr lang="en-US" u="sng" spc="-30" dirty="0">
+                <a:latin typeface="+mn-lt"/>
+              </a:rPr>
+              <a:t>Single Prediction</a:t>
+            </a:r>
+            <a:endParaRPr u="sng" dirty="0">
+              <a:latin typeface="+mn-lt"/>
+              <a:cs typeface="Caladea"/>
+            </a:endParaRPr>
+          </a:p>
+        </p:txBody>
+      </p:sp>
+      <p:sp>
+        <p:nvSpPr>
+          <p:cNvPr id="5" name="object 43"/>
+          <p:cNvSpPr txBox="1">
+            <a:spLocks noGrp="1"/>
+          </p:cNvSpPr>
+          <p:nvPr>
+            <p:ph type="sldNum" sz="quarter" idx="7"/>
+          </p:nvPr>
+        </p:nvSpPr>
+        <p:spPr>
+          <a:xfrm>
+            <a:off x="10367518" y="6620937"/>
+            <a:ext cx="244475" cy="204470"/>
+          </a:xfrm>
+          <a:prstGeom prst="rect">
+            <a:avLst/>
+          </a:prstGeom>
+        </p:spPr>
+        <p:txBody>
+          <a:bodyPr vert="horz" wrap="square" lIns="0" tIns="5080" rIns="0" bIns="0" rtlCol="0">
+            <a:spAutoFit/>
+          </a:bodyPr>
+          <a:lstStyle/>
+          <a:p>
+            <a:pPr marL="38100">
+              <a:lnSpc>
+                <a:spcPct val="100000"/>
+              </a:lnSpc>
+              <a:spcBef>
+                <a:spcPts val="40"/>
+              </a:spcBef>
+            </a:pPr>
+            <a:fld id="{81D60167-4931-47E6-BA6A-407CBD079E47}" type="slidenum">
+              <a:rPr spc="-5" dirty="0"/>
+              <a:pPr marL="38100">
+                <a:lnSpc>
+                  <a:spcPct val="100000"/>
+                </a:lnSpc>
+                <a:spcBef>
+                  <a:spcPts val="40"/>
+                </a:spcBef>
+              </a:pPr>
+              <a:t>14</a:t>
+            </a:fld>
+            <a:endParaRPr spc="-5" dirty="0"/>
+          </a:p>
+        </p:txBody>
+      </p:sp>
+      <p:sp>
+        <p:nvSpPr>
+          <p:cNvPr id="6" name="Rectangle 5"/>
+          <p:cNvSpPr/>
+          <p:nvPr/>
+        </p:nvSpPr>
+        <p:spPr>
+          <a:xfrm>
+            <a:off x="1447800" y="6581001"/>
+            <a:ext cx="1144737" cy="276999"/>
+          </a:xfrm>
+          <a:prstGeom prst="rect">
+            <a:avLst/>
+          </a:prstGeom>
+        </p:spPr>
+        <p:txBody>
+          <a:bodyPr wrap="none">
+            <a:spAutoFit/>
+          </a:bodyPr>
+          <a:lstStyle/>
+          <a:p>
+            <a:pPr marL="12700">
+              <a:lnSpc>
+                <a:spcPct val="100000"/>
+              </a:lnSpc>
+              <a:spcBef>
+                <a:spcPts val="40"/>
+              </a:spcBef>
+            </a:pPr>
+            <a:r>
+              <a:rPr lang="en-GB" sz="1200" spc="-5" dirty="0" err="1"/>
+              <a:t>Hemant</a:t>
+            </a:r>
+            <a:r>
+              <a:rPr lang="en-GB" sz="1200" spc="-5" dirty="0"/>
+              <a:t> &amp; Jane</a:t>
+            </a:r>
+          </a:p>
+        </p:txBody>
+      </p:sp>
+    </p:spTree>
+    <p:extLst>
+      <p:ext uri="{BB962C8B-B14F-4D97-AF65-F5344CB8AC3E}">
+        <p14:creationId xmlns="" xmlns:p14="http://schemas.microsoft.com/office/powerpoint/2010/main" val="2377121716"/>
+      </p:ext>
+    </p:extLst>
+  </p:cSld>
+  <p:clrMapOvr>
+    <a:masterClrMapping/>
+  </p:clrMapOvr>
+  <p:transition spd="med">
+    <p:wedge/>
   </p:transition>
   <p:timing>
     <p:tnLst>
@@ -20092,221 +20108,10 @@
       </p:grpSpPr>
       <p:pic>
         <p:nvPicPr>
-          <p:cNvPr id="2" name="Picture 1">
-            <a:extLst>
-              <a:ext uri="{FF2B5EF4-FFF2-40B4-BE49-F238E27FC236}">
-                <a16:creationId xmlns:a16="http://schemas.microsoft.com/office/drawing/2014/main" xmlns="" id="{F100583E-E620-4691-8152-6B63F1BCEA81}"/>
-              </a:ext>
-            </a:extLst>
-          </p:cNvPr>
-          <p:cNvPicPr>
-            <a:picLocks noChangeAspect="1"/>
-          </p:cNvPicPr>
-          <p:nvPr/>
-        </p:nvPicPr>
-        <p:blipFill>
-          <a:blip r:embed="rId2"/>
-          <a:stretch>
-            <a:fillRect/>
-          </a:stretch>
-        </p:blipFill>
-        <p:spPr>
-          <a:xfrm>
-            <a:off x="1043859" y="980728"/>
-            <a:ext cx="10095942" cy="5313224"/>
-          </a:xfrm>
-          <a:prstGeom prst="rect">
-            <a:avLst/>
-          </a:prstGeom>
-        </p:spPr>
-      </p:pic>
-      <p:sp>
-        <p:nvSpPr>
-          <p:cNvPr id="4" name="object 37">
-            <a:extLst>
-              <a:ext uri="{FF2B5EF4-FFF2-40B4-BE49-F238E27FC236}">
-                <a16:creationId xmlns:a16="http://schemas.microsoft.com/office/drawing/2014/main" xmlns="" id="{6436B395-45B5-4726-89B5-902F8FC1175C}"/>
-              </a:ext>
-            </a:extLst>
-          </p:cNvPr>
-          <p:cNvSpPr txBox="1">
-            <a:spLocks noGrp="1"/>
-          </p:cNvSpPr>
-          <p:nvPr>
-            <p:ph type="title"/>
-          </p:nvPr>
-        </p:nvSpPr>
-        <p:spPr>
-          <a:xfrm>
-            <a:off x="3359696" y="125914"/>
-            <a:ext cx="5029200" cy="536044"/>
-          </a:xfrm>
-          <a:prstGeom prst="rect">
-            <a:avLst/>
-          </a:prstGeom>
-        </p:spPr>
-        <p:txBody>
-          <a:bodyPr vert="horz" wrap="square" lIns="0" tIns="12700" rIns="0" bIns="0" rtlCol="0">
-            <a:spAutoFit/>
-          </a:bodyPr>
-          <a:lstStyle/>
-          <a:p>
-            <a:pPr marL="12700" algn="ctr">
-              <a:lnSpc>
-                <a:spcPct val="100000"/>
-              </a:lnSpc>
-              <a:spcBef>
-                <a:spcPts val="100"/>
-              </a:spcBef>
-            </a:pPr>
-            <a:r>
-              <a:rPr lang="en-US" u="sng" spc="-30" dirty="0">
-                <a:latin typeface="+mn-lt"/>
-              </a:rPr>
-              <a:t>Single Prediction</a:t>
-            </a:r>
-            <a:endParaRPr u="sng" dirty="0">
-              <a:latin typeface="+mn-lt"/>
-              <a:cs typeface="Caladea"/>
-            </a:endParaRPr>
-          </a:p>
-        </p:txBody>
-      </p:sp>
-      <p:sp>
-        <p:nvSpPr>
-          <p:cNvPr id="5" name="object 43"/>
-          <p:cNvSpPr txBox="1">
-            <a:spLocks noGrp="1"/>
-          </p:cNvSpPr>
-          <p:nvPr>
-            <p:ph type="sldNum" sz="quarter" idx="7"/>
-          </p:nvPr>
-        </p:nvSpPr>
-        <p:spPr>
-          <a:xfrm>
-            <a:off x="10367518" y="6620937"/>
-            <a:ext cx="244475" cy="204470"/>
-          </a:xfrm>
-          <a:prstGeom prst="rect">
-            <a:avLst/>
-          </a:prstGeom>
-        </p:spPr>
-        <p:txBody>
-          <a:bodyPr vert="horz" wrap="square" lIns="0" tIns="5080" rIns="0" bIns="0" rtlCol="0">
-            <a:spAutoFit/>
-          </a:bodyPr>
-          <a:lstStyle/>
-          <a:p>
-            <a:pPr marL="38100">
-              <a:lnSpc>
-                <a:spcPct val="100000"/>
-              </a:lnSpc>
-              <a:spcBef>
-                <a:spcPts val="40"/>
-              </a:spcBef>
-            </a:pPr>
-            <a:fld id="{81D60167-4931-47E6-BA6A-407CBD079E47}" type="slidenum">
-              <a:rPr spc="-5" dirty="0"/>
-              <a:pPr marL="38100">
-                <a:lnSpc>
-                  <a:spcPct val="100000"/>
-                </a:lnSpc>
-                <a:spcBef>
-                  <a:spcPts val="40"/>
-                </a:spcBef>
-              </a:pPr>
-              <a:t>15</a:t>
-            </a:fld>
-            <a:endParaRPr spc="-5" dirty="0"/>
-          </a:p>
-        </p:txBody>
-      </p:sp>
-      <p:sp>
-        <p:nvSpPr>
-          <p:cNvPr id="6" name="Rectangle 5"/>
-          <p:cNvSpPr/>
-          <p:nvPr/>
-        </p:nvSpPr>
-        <p:spPr>
-          <a:xfrm>
-            <a:off x="1447800" y="6581001"/>
-            <a:ext cx="1144737" cy="276999"/>
-          </a:xfrm>
-          <a:prstGeom prst="rect">
-            <a:avLst/>
-          </a:prstGeom>
-        </p:spPr>
-        <p:txBody>
-          <a:bodyPr wrap="none">
-            <a:spAutoFit/>
-          </a:bodyPr>
-          <a:lstStyle/>
-          <a:p>
-            <a:pPr marL="12700">
-              <a:lnSpc>
-                <a:spcPct val="100000"/>
-              </a:lnSpc>
-              <a:spcBef>
-                <a:spcPts val="40"/>
-              </a:spcBef>
-            </a:pPr>
-            <a:r>
-              <a:rPr lang="en-GB" sz="1200" spc="-5" dirty="0" err="1"/>
-              <a:t>Hemant</a:t>
-            </a:r>
-            <a:r>
-              <a:rPr lang="en-GB" sz="1200" spc="-5" dirty="0"/>
-              <a:t> &amp; Jane</a:t>
-            </a:r>
-          </a:p>
-        </p:txBody>
-      </p:sp>
-    </p:spTree>
-    <p:extLst>
-      <p:ext uri="{BB962C8B-B14F-4D97-AF65-F5344CB8AC3E}">
-        <p14:creationId xmlns:p14="http://schemas.microsoft.com/office/powerpoint/2010/main" xmlns="" val="2377121716"/>
-      </p:ext>
-    </p:extLst>
-  </p:cSld>
-  <p:clrMapOvr>
-    <a:masterClrMapping/>
-  </p:clrMapOvr>
-  <p:transition spd="med">
-    <p:wedge/>
-  </p:transition>
-  <p:timing>
-    <p:tnLst>
-      <p:par>
-        <p:cTn id="1" dur="indefinite" restart="never" nodeType="tmRoot"/>
-      </p:par>
-    </p:tnLst>
-  </p:timing>
-</p:sld>
-</file>
-
-<file path=ppt/slides/slide16.xml><?xml version="1.0" encoding="utf-8"?>
-<p:sld xmlns:a="http://schemas.openxmlformats.org/drawingml/2006/main" xmlns:r="http://schemas.openxmlformats.org/officeDocument/2006/relationships" xmlns:p="http://schemas.openxmlformats.org/presentationml/2006/main">
-  <p:cSld>
-    <p:spTree>
-      <p:nvGrpSpPr>
-        <p:cNvPr id="1" name=""/>
-        <p:cNvGrpSpPr/>
-        <p:nvPr/>
-      </p:nvGrpSpPr>
-      <p:grpSpPr>
-        <a:xfrm>
-          <a:off x="0" y="0"/>
-          <a:ext cx="0" cy="0"/>
-          <a:chOff x="0" y="0"/>
-          <a:chExt cx="0" cy="0"/>
-        </a:xfrm>
-      </p:grpSpPr>
-      <p:pic>
-        <p:nvPicPr>
           <p:cNvPr id="4" name="Picture 3">
             <a:extLst>
               <a:ext uri="{FF2B5EF4-FFF2-40B4-BE49-F238E27FC236}">
-                <a16:creationId xmlns:a16="http://schemas.microsoft.com/office/drawing/2014/main" xmlns="" id="{7B252561-A769-47D3-A232-C317AC0E81ED}"/>
+                <a16:creationId xmlns="" xmlns:a16="http://schemas.microsoft.com/office/drawing/2014/main" id="{7B252561-A769-47D3-A232-C317AC0E81ED}"/>
               </a:ext>
             </a:extLst>
           </p:cNvPr>
@@ -20336,7 +20141,7 @@
           <p:cNvPr id="5" name="object 37">
             <a:extLst>
               <a:ext uri="{FF2B5EF4-FFF2-40B4-BE49-F238E27FC236}">
-                <a16:creationId xmlns:a16="http://schemas.microsoft.com/office/drawing/2014/main" xmlns="" id="{8E3D5081-1E0D-4786-9D64-58DE96D24340}"/>
+                <a16:creationId xmlns="" xmlns:a16="http://schemas.microsoft.com/office/drawing/2014/main" id="{8E3D5081-1E0D-4786-9D64-58DE96D24340}"/>
               </a:ext>
             </a:extLst>
           </p:cNvPr>
@@ -20426,7 +20231,7 @@
                   <a:spcPts val="40"/>
                 </a:spcBef>
               </a:pPr>
-              <a:t>16</a:t>
+              <a:t>15</a:t>
             </a:fld>
             <a:endParaRPr spc="-5" dirty="0"/>
           </a:p>
@@ -20475,7 +20280,7 @@
     </p:spTree>
     <p:extLst>
       <p:ext uri="{BB962C8B-B14F-4D97-AF65-F5344CB8AC3E}">
-        <p14:creationId xmlns:p14="http://schemas.microsoft.com/office/powerpoint/2010/main" xmlns="" val="1761402563"/>
+        <p14:creationId xmlns="" xmlns:p14="http://schemas.microsoft.com/office/powerpoint/2010/main" val="1761402563"/>
       </p:ext>
     </p:extLst>
   </p:cSld>
@@ -20495,7 +20300,7 @@
 </p:sld>
 </file>
 
-<file path=ppt/slides/slide17.xml><?xml version="1.0" encoding="utf-8"?>
+<file path=ppt/slides/slide16.xml><?xml version="1.0" encoding="utf-8"?>
 <p:sld xmlns:a="http://schemas.openxmlformats.org/drawingml/2006/main" xmlns:r="http://schemas.openxmlformats.org/officeDocument/2006/relationships" xmlns:p="http://schemas.openxmlformats.org/presentationml/2006/main">
   <p:cSld>
     <p:spTree>
@@ -20517,7 +20322,7 @@
           <p:cNvPr id="5" name="object 37">
             <a:extLst>
               <a:ext uri="{FF2B5EF4-FFF2-40B4-BE49-F238E27FC236}">
-                <a16:creationId xmlns:a16="http://schemas.microsoft.com/office/drawing/2014/main" xmlns="" id="{8E3D5081-1E0D-4786-9D64-58DE96D24340}"/>
+                <a16:creationId xmlns="" xmlns:a16="http://schemas.microsoft.com/office/drawing/2014/main" id="{8E3D5081-1E0D-4786-9D64-58DE96D24340}"/>
               </a:ext>
             </a:extLst>
           </p:cNvPr>
@@ -20569,7 +20374,7 @@
           <p:cNvPr id="2" name="Picture 1">
             <a:extLst>
               <a:ext uri="{FF2B5EF4-FFF2-40B4-BE49-F238E27FC236}">
-                <a16:creationId xmlns:a16="http://schemas.microsoft.com/office/drawing/2014/main" xmlns="" id="{8CC10DEB-D63D-4CF9-A5FD-3CDB499D9AA5}"/>
+                <a16:creationId xmlns="" xmlns:a16="http://schemas.microsoft.com/office/drawing/2014/main" id="{8CC10DEB-D63D-4CF9-A5FD-3CDB499D9AA5}"/>
               </a:ext>
             </a:extLst>
           </p:cNvPr>
@@ -20637,7 +20442,7 @@
                   <a:spcPts val="40"/>
                 </a:spcBef>
               </a:pPr>
-              <a:t>17</a:t>
+              <a:t>16</a:t>
             </a:fld>
             <a:endParaRPr spc="-5" dirty="0"/>
           </a:p>
@@ -20686,7 +20491,7 @@
     </p:spTree>
     <p:extLst>
       <p:ext uri="{BB962C8B-B14F-4D97-AF65-F5344CB8AC3E}">
-        <p14:creationId xmlns:p14="http://schemas.microsoft.com/office/powerpoint/2010/main" xmlns="" val="2385884356"/>
+        <p14:creationId xmlns="" xmlns:p14="http://schemas.microsoft.com/office/powerpoint/2010/main" val="2385884356"/>
       </p:ext>
     </p:extLst>
   </p:cSld>
@@ -20706,7 +20511,7 @@
 </p:sld>
 </file>
 
-<file path=ppt/slides/slide18.xml><?xml version="1.0" encoding="utf-8"?>
+<file path=ppt/slides/slide17.xml><?xml version="1.0" encoding="utf-8"?>
 <p:sld xmlns:a="http://schemas.openxmlformats.org/drawingml/2006/main" xmlns:r="http://schemas.openxmlformats.org/officeDocument/2006/relationships" xmlns:p="http://schemas.openxmlformats.org/presentationml/2006/main">
   <p:cSld>
     <p:spTree>
@@ -21008,7 +20813,7 @@
                 <a:tabLst/>
                 <a:defRPr/>
               </a:pPr>
-              <a:t>18</a:t>
+              <a:t>17</a:t>
             </a:fld>
             <a:endParaRPr kumimoji="0" lang="en-GB" sz="1200" b="0" i="0" u="none" strike="noStrike" kern="1200" cap="none" spc="-5" normalizeH="0" baseline="0" noProof="0" dirty="0">
               <a:ln>
@@ -21157,7 +20962,7 @@
 </p:sld>
 </file>
 
-<file path=ppt/slides/slide19.xml><?xml version="1.0" encoding="utf-8"?>
+<file path=ppt/slides/slide18.xml><?xml version="1.0" encoding="utf-8"?>
 <p:sld xmlns:a="http://schemas.openxmlformats.org/drawingml/2006/main" xmlns:r="http://schemas.openxmlformats.org/officeDocument/2006/relationships" xmlns:p="http://schemas.openxmlformats.org/presentationml/2006/main">
   <p:cSld>
     <p:spTree>
@@ -21291,7 +21096,7 @@
                 <a:tabLst/>
                 <a:defRPr/>
               </a:pPr>
-              <a:t>19</a:t>
+              <a:t>18</a:t>
             </a:fld>
             <a:endParaRPr kumimoji="0" lang="en-GB" sz="1200" b="0" i="0" u="none" strike="noStrike" kern="1200" cap="none" spc="-5" normalizeH="0" baseline="0" noProof="0" dirty="0">
               <a:ln>
@@ -21512,243 +21317,7 @@
 </p:sld>
 </file>
 
-<file path=ppt/slides/slide2.xml><?xml version="1.0" encoding="utf-8"?>
-<p:sld xmlns:a="http://schemas.openxmlformats.org/drawingml/2006/main" xmlns:r="http://schemas.openxmlformats.org/officeDocument/2006/relationships" xmlns:p="http://schemas.openxmlformats.org/presentationml/2006/main">
-  <p:cSld>
-    <p:spTree>
-      <p:nvGrpSpPr>
-        <p:cNvPr id="1" name=""/>
-        <p:cNvGrpSpPr/>
-        <p:nvPr/>
-      </p:nvGrpSpPr>
-      <p:grpSpPr>
-        <a:xfrm>
-          <a:off x="0" y="0"/>
-          <a:ext cx="0" cy="0"/>
-          <a:chOff x="0" y="0"/>
-          <a:chExt cx="0" cy="0"/>
-        </a:xfrm>
-      </p:grpSpPr>
-      <p:sp>
-        <p:nvSpPr>
-          <p:cNvPr id="2" name="Title 1"/>
-          <p:cNvSpPr>
-            <a:spLocks noGrp="1"/>
-          </p:cNvSpPr>
-          <p:nvPr>
-            <p:ph type="title"/>
-          </p:nvPr>
-        </p:nvSpPr>
-        <p:spPr>
-          <a:xfrm>
-            <a:off x="1602994" y="258825"/>
-            <a:ext cx="8986011" cy="677108"/>
-          </a:xfrm>
-        </p:spPr>
-        <p:txBody>
-          <a:bodyPr/>
-          <a:lstStyle/>
-          <a:p>
-            <a:pPr algn="ctr"/>
-            <a:r>
-              <a:rPr lang="en-GB" sz="4400" u="sng" spc="-20" dirty="0">
-                <a:latin typeface="+mn-lt"/>
-              </a:rPr>
-              <a:t>Breast </a:t>
-            </a:r>
-            <a:r>
-              <a:rPr lang="en-GB" sz="4400" u="sng" dirty="0">
-                <a:latin typeface="+mn-lt"/>
-              </a:rPr>
-              <a:t>Cancer</a:t>
-            </a:r>
-            <a:r>
-              <a:rPr lang="en-GB" sz="4400" u="sng" spc="10" dirty="0">
-                <a:latin typeface="+mn-lt"/>
-              </a:rPr>
-              <a:t> </a:t>
-            </a:r>
-            <a:r>
-              <a:rPr lang="en-GB" sz="4400" u="sng" spc="-5" dirty="0">
-                <a:latin typeface="+mn-lt"/>
-              </a:rPr>
-              <a:t>Diagnosis</a:t>
-            </a:r>
-            <a:endParaRPr lang="en-GB" sz="4400" u="sng" dirty="0">
-              <a:latin typeface="+mn-lt"/>
-            </a:endParaRPr>
-          </a:p>
-        </p:txBody>
-      </p:sp>
-      <p:pic>
-        <p:nvPicPr>
-          <p:cNvPr id="5" name="Picture 4" descr="189.jpg"/>
-          <p:cNvPicPr>
-            <a:picLocks noChangeAspect="1"/>
-          </p:cNvPicPr>
-          <p:nvPr/>
-        </p:nvPicPr>
-        <p:blipFill>
-          <a:blip r:embed="rId2"/>
-          <a:stretch>
-            <a:fillRect/>
-          </a:stretch>
-        </p:blipFill>
-        <p:spPr>
-          <a:xfrm>
-            <a:off x="5172075" y="2514600"/>
-            <a:ext cx="7019925" cy="3943350"/>
-          </a:xfrm>
-          <a:prstGeom prst="rect">
-            <a:avLst/>
-          </a:prstGeom>
-        </p:spPr>
-      </p:pic>
-      <p:sp>
-        <p:nvSpPr>
-          <p:cNvPr id="6" name="object 6"/>
-          <p:cNvSpPr/>
-          <p:nvPr/>
-        </p:nvSpPr>
-        <p:spPr>
-          <a:xfrm>
-            <a:off x="5167306" y="2071678"/>
-            <a:ext cx="1335658" cy="1281429"/>
-          </a:xfrm>
-          <a:prstGeom prst="rect">
-            <a:avLst/>
-          </a:prstGeom>
-          <a:blipFill>
-            <a:blip r:embed="rId3" cstate="print"/>
-            <a:stretch>
-              <a:fillRect/>
-            </a:stretch>
-          </a:blipFill>
-        </p:spPr>
-        <p:txBody>
-          <a:bodyPr wrap="square" lIns="0" tIns="0" rIns="0" bIns="0" rtlCol="0"/>
-          <a:lstStyle/>
-          <a:p>
-            <a:endParaRPr/>
-          </a:p>
-        </p:txBody>
-      </p:sp>
-      <p:sp>
-        <p:nvSpPr>
-          <p:cNvPr id="10" name="Rectangle 9"/>
-          <p:cNvSpPr/>
-          <p:nvPr/>
-        </p:nvSpPr>
-        <p:spPr>
-          <a:xfrm>
-            <a:off x="1143000" y="6488668"/>
-            <a:ext cx="1144737" cy="461665"/>
-          </a:xfrm>
-          <a:prstGeom prst="rect">
-            <a:avLst/>
-          </a:prstGeom>
-        </p:spPr>
-        <p:txBody>
-          <a:bodyPr wrap="none">
-            <a:spAutoFit/>
-          </a:bodyPr>
-          <a:lstStyle/>
-          <a:p>
-            <a:pPr marL="12700">
-              <a:spcBef>
-                <a:spcPts val="40"/>
-              </a:spcBef>
-            </a:pPr>
-            <a:r>
-              <a:rPr lang="en-GB" sz="1200" spc="-5" dirty="0" err="1"/>
-              <a:t>Hemant</a:t>
-            </a:r>
-            <a:r>
-              <a:rPr lang="en-GB" sz="1200" spc="-5" dirty="0"/>
-              <a:t> &amp; Jane</a:t>
-            </a:r>
-          </a:p>
-          <a:p>
-            <a:pPr marL="12700">
-              <a:lnSpc>
-                <a:spcPct val="100000"/>
-              </a:lnSpc>
-              <a:spcBef>
-                <a:spcPts val="40"/>
-              </a:spcBef>
-            </a:pPr>
-            <a:endParaRPr lang="en-GB" sz="1200" spc="-5" dirty="0"/>
-          </a:p>
-        </p:txBody>
-      </p:sp>
-      <p:sp>
-        <p:nvSpPr>
-          <p:cNvPr id="12" name="object 45"/>
-          <p:cNvSpPr txBox="1">
-            <a:spLocks noGrp="1"/>
-          </p:cNvSpPr>
-          <p:nvPr>
-            <p:ph type="sldNum" sz="quarter" idx="7"/>
-          </p:nvPr>
-        </p:nvSpPr>
-        <p:spPr>
-          <a:xfrm>
-            <a:off x="10367518" y="6620937"/>
-            <a:ext cx="244475" cy="204470"/>
-          </a:xfrm>
-          <a:prstGeom prst="rect">
-            <a:avLst/>
-          </a:prstGeom>
-        </p:spPr>
-        <p:txBody>
-          <a:bodyPr vert="horz" wrap="square" lIns="0" tIns="5080" rIns="0" bIns="0" rtlCol="0">
-            <a:spAutoFit/>
-          </a:bodyPr>
-          <a:lstStyle/>
-          <a:p>
-            <a:pPr marL="38100">
-              <a:lnSpc>
-                <a:spcPct val="100000"/>
-              </a:lnSpc>
-              <a:spcBef>
-                <a:spcPts val="40"/>
-              </a:spcBef>
-            </a:pPr>
-            <a:fld id="{81D60167-4931-47E6-BA6A-407CBD079E47}" type="slidenum">
-              <a:rPr spc="-5" dirty="0"/>
-              <a:pPr marL="38100">
-                <a:lnSpc>
-                  <a:spcPct val="100000"/>
-                </a:lnSpc>
-                <a:spcBef>
-                  <a:spcPts val="40"/>
-                </a:spcBef>
-              </a:pPr>
-              <a:t>2</a:t>
-            </a:fld>
-            <a:endParaRPr spc="-5" dirty="0"/>
-          </a:p>
-        </p:txBody>
-      </p:sp>
-    </p:spTree>
-  </p:cSld>
-  <p:clrMapOvr>
-    <a:masterClrMapping/>
-  </p:clrMapOvr>
-  <p:transition spd="med">
-    <p:wedge/>
-  </p:transition>
-  <p:timing>
-    <p:tnLst>
-      <p:par>
-        <p:cTn id="1" dur="indefinite" restart="never" nodeType="tmRoot"/>
-      </p:par>
-    </p:tnLst>
-  </p:timing>
-</p:sld>
-</file>
-
-<file path=ppt/slides/slide20.xml><?xml version="1.0" encoding="utf-8"?>
+<file path=ppt/slides/slide19.xml><?xml version="1.0" encoding="utf-8"?>
 <p:sld xmlns:a="http://schemas.openxmlformats.org/drawingml/2006/main" xmlns:r="http://schemas.openxmlformats.org/officeDocument/2006/relationships" xmlns:p="http://schemas.openxmlformats.org/presentationml/2006/main">
   <p:cSld>
     <p:spTree>
@@ -21770,7 +21339,7 @@
           <p:cNvPr id="2" name="Title 1">
             <a:extLst>
               <a:ext uri="{FF2B5EF4-FFF2-40B4-BE49-F238E27FC236}">
-                <a16:creationId xmlns:a16="http://schemas.microsoft.com/office/drawing/2014/main" xmlns="" id="{D78755C9-053F-4B06-AC06-F6EB00DB67DB}"/>
+                <a16:creationId xmlns="" xmlns:a16="http://schemas.microsoft.com/office/drawing/2014/main" id="{D78755C9-053F-4B06-AC06-F6EB00DB67DB}"/>
               </a:ext>
             </a:extLst>
           </p:cNvPr>
@@ -21805,7 +21374,7 @@
           <p:cNvPr id="3" name="Text Placeholder 2">
             <a:extLst>
               <a:ext uri="{FF2B5EF4-FFF2-40B4-BE49-F238E27FC236}">
-                <a16:creationId xmlns:a16="http://schemas.microsoft.com/office/drawing/2014/main" xmlns="" id="{2C832020-C767-4F35-BF67-222F39104691}"/>
+                <a16:creationId xmlns="" xmlns:a16="http://schemas.microsoft.com/office/drawing/2014/main" id="{2C832020-C767-4F35-BF67-222F39104691}"/>
               </a:ext>
             </a:extLst>
           </p:cNvPr>
@@ -22078,7 +21647,7 @@
                   <a:spcPts val="40"/>
                 </a:spcBef>
               </a:pPr>
-              <a:t>20</a:t>
+              <a:t>19</a:t>
             </a:fld>
             <a:endParaRPr spc="-5" dirty="0"/>
           </a:p>
@@ -22087,7 +21656,7 @@
     </p:spTree>
     <p:extLst>
       <p:ext uri="{BB962C8B-B14F-4D97-AF65-F5344CB8AC3E}">
-        <p14:creationId xmlns:p14="http://schemas.microsoft.com/office/powerpoint/2010/main" xmlns="" val="242542250"/>
+        <p14:creationId xmlns="" xmlns:p14="http://schemas.microsoft.com/office/powerpoint/2010/main" val="242542250"/>
       </p:ext>
     </p:extLst>
   </p:cSld>
@@ -22107,7 +21676,243 @@
 </p:sld>
 </file>
 
-<file path=ppt/slides/slide21.xml><?xml version="1.0" encoding="utf-8"?>
+<file path=ppt/slides/slide2.xml><?xml version="1.0" encoding="utf-8"?>
+<p:sld xmlns:a="http://schemas.openxmlformats.org/drawingml/2006/main" xmlns:r="http://schemas.openxmlformats.org/officeDocument/2006/relationships" xmlns:p="http://schemas.openxmlformats.org/presentationml/2006/main">
+  <p:cSld>
+    <p:spTree>
+      <p:nvGrpSpPr>
+        <p:cNvPr id="1" name=""/>
+        <p:cNvGrpSpPr/>
+        <p:nvPr/>
+      </p:nvGrpSpPr>
+      <p:grpSpPr>
+        <a:xfrm>
+          <a:off x="0" y="0"/>
+          <a:ext cx="0" cy="0"/>
+          <a:chOff x="0" y="0"/>
+          <a:chExt cx="0" cy="0"/>
+        </a:xfrm>
+      </p:grpSpPr>
+      <p:sp>
+        <p:nvSpPr>
+          <p:cNvPr id="2" name="Title 1"/>
+          <p:cNvSpPr>
+            <a:spLocks noGrp="1"/>
+          </p:cNvSpPr>
+          <p:nvPr>
+            <p:ph type="title"/>
+          </p:nvPr>
+        </p:nvSpPr>
+        <p:spPr>
+          <a:xfrm>
+            <a:off x="1602994" y="258825"/>
+            <a:ext cx="8986011" cy="677108"/>
+          </a:xfrm>
+        </p:spPr>
+        <p:txBody>
+          <a:bodyPr/>
+          <a:lstStyle/>
+          <a:p>
+            <a:pPr algn="ctr"/>
+            <a:r>
+              <a:rPr lang="en-GB" sz="4400" u="sng" spc="-20" dirty="0">
+                <a:latin typeface="+mn-lt"/>
+              </a:rPr>
+              <a:t>Breast </a:t>
+            </a:r>
+            <a:r>
+              <a:rPr lang="en-GB" sz="4400" u="sng" dirty="0">
+                <a:latin typeface="+mn-lt"/>
+              </a:rPr>
+              <a:t>Cancer</a:t>
+            </a:r>
+            <a:r>
+              <a:rPr lang="en-GB" sz="4400" u="sng" spc="10" dirty="0">
+                <a:latin typeface="+mn-lt"/>
+              </a:rPr>
+              <a:t> </a:t>
+            </a:r>
+            <a:r>
+              <a:rPr lang="en-GB" sz="4400" u="sng" spc="-5" dirty="0">
+                <a:latin typeface="+mn-lt"/>
+              </a:rPr>
+              <a:t>Diagnosis</a:t>
+            </a:r>
+            <a:endParaRPr lang="en-GB" sz="4400" u="sng" dirty="0">
+              <a:latin typeface="+mn-lt"/>
+            </a:endParaRPr>
+          </a:p>
+        </p:txBody>
+      </p:sp>
+      <p:pic>
+        <p:nvPicPr>
+          <p:cNvPr id="5" name="Picture 4" descr="189.jpg"/>
+          <p:cNvPicPr>
+            <a:picLocks noChangeAspect="1"/>
+          </p:cNvPicPr>
+          <p:nvPr/>
+        </p:nvPicPr>
+        <p:blipFill>
+          <a:blip r:embed="rId2"/>
+          <a:stretch>
+            <a:fillRect/>
+          </a:stretch>
+        </p:blipFill>
+        <p:spPr>
+          <a:xfrm>
+            <a:off x="5172075" y="2514600"/>
+            <a:ext cx="7019925" cy="3943350"/>
+          </a:xfrm>
+          <a:prstGeom prst="rect">
+            <a:avLst/>
+          </a:prstGeom>
+        </p:spPr>
+      </p:pic>
+      <p:sp>
+        <p:nvSpPr>
+          <p:cNvPr id="6" name="object 6"/>
+          <p:cNvSpPr/>
+          <p:nvPr/>
+        </p:nvSpPr>
+        <p:spPr>
+          <a:xfrm>
+            <a:off x="5167306" y="2071678"/>
+            <a:ext cx="1335658" cy="1281429"/>
+          </a:xfrm>
+          <a:prstGeom prst="rect">
+            <a:avLst/>
+          </a:prstGeom>
+          <a:blipFill>
+            <a:blip r:embed="rId3" cstate="print"/>
+            <a:stretch>
+              <a:fillRect/>
+            </a:stretch>
+          </a:blipFill>
+        </p:spPr>
+        <p:txBody>
+          <a:bodyPr wrap="square" lIns="0" tIns="0" rIns="0" bIns="0" rtlCol="0"/>
+          <a:lstStyle/>
+          <a:p>
+            <a:endParaRPr/>
+          </a:p>
+        </p:txBody>
+      </p:sp>
+      <p:sp>
+        <p:nvSpPr>
+          <p:cNvPr id="10" name="Rectangle 9"/>
+          <p:cNvSpPr/>
+          <p:nvPr/>
+        </p:nvSpPr>
+        <p:spPr>
+          <a:xfrm>
+            <a:off x="1143000" y="6488668"/>
+            <a:ext cx="1144737" cy="461665"/>
+          </a:xfrm>
+          <a:prstGeom prst="rect">
+            <a:avLst/>
+          </a:prstGeom>
+        </p:spPr>
+        <p:txBody>
+          <a:bodyPr wrap="none">
+            <a:spAutoFit/>
+          </a:bodyPr>
+          <a:lstStyle/>
+          <a:p>
+            <a:pPr marL="12700">
+              <a:spcBef>
+                <a:spcPts val="40"/>
+              </a:spcBef>
+            </a:pPr>
+            <a:r>
+              <a:rPr lang="en-GB" sz="1200" spc="-5" dirty="0" err="1"/>
+              <a:t>Hemant</a:t>
+            </a:r>
+            <a:r>
+              <a:rPr lang="en-GB" sz="1200" spc="-5" dirty="0"/>
+              <a:t> &amp; Jane</a:t>
+            </a:r>
+          </a:p>
+          <a:p>
+            <a:pPr marL="12700">
+              <a:lnSpc>
+                <a:spcPct val="100000"/>
+              </a:lnSpc>
+              <a:spcBef>
+                <a:spcPts val="40"/>
+              </a:spcBef>
+            </a:pPr>
+            <a:endParaRPr lang="en-GB" sz="1200" spc="-5" dirty="0"/>
+          </a:p>
+        </p:txBody>
+      </p:sp>
+      <p:sp>
+        <p:nvSpPr>
+          <p:cNvPr id="12" name="object 45"/>
+          <p:cNvSpPr txBox="1">
+            <a:spLocks noGrp="1"/>
+          </p:cNvSpPr>
+          <p:nvPr>
+            <p:ph type="sldNum" sz="quarter" idx="7"/>
+          </p:nvPr>
+        </p:nvSpPr>
+        <p:spPr>
+          <a:xfrm>
+            <a:off x="10367518" y="6620937"/>
+            <a:ext cx="244475" cy="204470"/>
+          </a:xfrm>
+          <a:prstGeom prst="rect">
+            <a:avLst/>
+          </a:prstGeom>
+        </p:spPr>
+        <p:txBody>
+          <a:bodyPr vert="horz" wrap="square" lIns="0" tIns="5080" rIns="0" bIns="0" rtlCol="0">
+            <a:spAutoFit/>
+          </a:bodyPr>
+          <a:lstStyle/>
+          <a:p>
+            <a:pPr marL="38100">
+              <a:lnSpc>
+                <a:spcPct val="100000"/>
+              </a:lnSpc>
+              <a:spcBef>
+                <a:spcPts val="40"/>
+              </a:spcBef>
+            </a:pPr>
+            <a:fld id="{81D60167-4931-47E6-BA6A-407CBD079E47}" type="slidenum">
+              <a:rPr spc="-5" dirty="0"/>
+              <a:pPr marL="38100">
+                <a:lnSpc>
+                  <a:spcPct val="100000"/>
+                </a:lnSpc>
+                <a:spcBef>
+                  <a:spcPts val="40"/>
+                </a:spcBef>
+              </a:pPr>
+              <a:t>2</a:t>
+            </a:fld>
+            <a:endParaRPr spc="-5" dirty="0"/>
+          </a:p>
+        </p:txBody>
+      </p:sp>
+    </p:spTree>
+  </p:cSld>
+  <p:clrMapOvr>
+    <a:masterClrMapping/>
+  </p:clrMapOvr>
+  <p:transition spd="med">
+    <p:wedge/>
+  </p:transition>
+  <p:timing>
+    <p:tnLst>
+      <p:par>
+        <p:cTn id="1" dur="indefinite" restart="never" nodeType="tmRoot"/>
+      </p:par>
+    </p:tnLst>
+  </p:timing>
+</p:sld>
+</file>
+
+<file path=ppt/slides/slide20.xml><?xml version="1.0" encoding="utf-8"?>
 <p:sld xmlns:a="http://schemas.openxmlformats.org/drawingml/2006/main" xmlns:r="http://schemas.openxmlformats.org/officeDocument/2006/relationships" xmlns:p="http://schemas.openxmlformats.org/presentationml/2006/main">
   <p:cSld>
     <p:spTree>
@@ -22378,7 +22183,7 @@
                   <a:spcPts val="40"/>
                 </a:spcBef>
               </a:pPr>
-              <a:t>21</a:t>
+              <a:t>20</a:t>
             </a:fld>
             <a:endParaRPr spc="-5" dirty="0"/>
           </a:p>
@@ -22402,7 +22207,7 @@
 </p:sld>
 </file>
 
-<file path=ppt/slides/slide22.xml><?xml version="1.0" encoding="utf-8"?>
+<file path=ppt/slides/slide21.xml><?xml version="1.0" encoding="utf-8"?>
 <p:sld xmlns:a="http://schemas.openxmlformats.org/drawingml/2006/main" xmlns:r="http://schemas.openxmlformats.org/officeDocument/2006/relationships" xmlns:p="http://schemas.openxmlformats.org/presentationml/2006/main">
   <p:cSld>
     <p:spTree>
@@ -22650,7 +22455,7 @@
                   <a:spcPts val="40"/>
                 </a:spcBef>
               </a:pPr>
-              <a:t>22</a:t>
+              <a:t>21</a:t>
             </a:fld>
             <a:endParaRPr spc="-5" dirty="0"/>
           </a:p>
@@ -22674,7 +22479,7 @@
 </p:sld>
 </file>
 
-<file path=ppt/slides/slide23.xml><?xml version="1.0" encoding="utf-8"?>
+<file path=ppt/slides/slide22.xml><?xml version="1.0" encoding="utf-8"?>
 <p:sld xmlns:a="http://schemas.openxmlformats.org/drawingml/2006/main" xmlns:r="http://schemas.openxmlformats.org/officeDocument/2006/relationships" xmlns:p="http://schemas.openxmlformats.org/presentationml/2006/main">
   <p:cSld>
     <p:spTree>
@@ -23016,7 +22821,7 @@
                   <a:spcPts val="40"/>
                 </a:spcBef>
               </a:pPr>
-              <a:t>23</a:t>
+              <a:t>22</a:t>
             </a:fld>
             <a:endParaRPr spc="-5" dirty="0"/>
           </a:p>
@@ -23040,7 +22845,7 @@
 </p:sld>
 </file>
 
-<file path=ppt/slides/slide24.xml><?xml version="1.0" encoding="utf-8"?>
+<file path=ppt/slides/slide23.xml><?xml version="1.0" encoding="utf-8"?>
 <p:sld xmlns:a="http://schemas.openxmlformats.org/drawingml/2006/main" xmlns:r="http://schemas.openxmlformats.org/officeDocument/2006/relationships" xmlns:p="http://schemas.openxmlformats.org/presentationml/2006/main">
   <p:cSld>
     <p:spTree>
@@ -23096,7 +22901,7 @@
                   <a:spcPts val="40"/>
                 </a:spcBef>
               </a:pPr>
-              <a:t>24</a:t>
+              <a:t>23</a:t>
             </a:fld>
             <a:endParaRPr spc="-5" dirty="0"/>
           </a:p>
@@ -24205,7 +24010,7 @@
           <p:cNvPr id="3" name="Text Placeholder 2">
             <a:extLst>
               <a:ext uri="{FF2B5EF4-FFF2-40B4-BE49-F238E27FC236}">
-                <a16:creationId xmlns:a16="http://schemas.microsoft.com/office/drawing/2014/main" xmlns="" id="{D03B2B98-9CBB-42B4-97D6-2030004BE74B}"/>
+                <a16:creationId xmlns="" xmlns:a16="http://schemas.microsoft.com/office/drawing/2014/main" id="{D03B2B98-9CBB-42B4-97D6-2030004BE74B}"/>
               </a:ext>
             </a:extLst>
           </p:cNvPr>
@@ -24388,7 +24193,7 @@
           <p:cNvPr id="4" name="Title 1">
             <a:extLst>
               <a:ext uri="{FF2B5EF4-FFF2-40B4-BE49-F238E27FC236}">
-                <a16:creationId xmlns:a16="http://schemas.microsoft.com/office/drawing/2014/main" xmlns="" id="{5115E20E-D4AE-4AEF-A001-3A2C9C8BE74B}"/>
+                <a16:creationId xmlns="" xmlns:a16="http://schemas.microsoft.com/office/drawing/2014/main" id="{5115E20E-D4AE-4AEF-A001-3A2C9C8BE74B}"/>
               </a:ext>
             </a:extLst>
           </p:cNvPr>
@@ -24529,7 +24334,7 @@
     </p:spTree>
     <p:extLst>
       <p:ext uri="{BB962C8B-B14F-4D97-AF65-F5344CB8AC3E}">
-        <p14:creationId xmlns:p14="http://schemas.microsoft.com/office/powerpoint/2010/main" xmlns="" val="3590634898"/>
+        <p14:creationId xmlns="" xmlns:p14="http://schemas.microsoft.com/office/powerpoint/2010/main" val="3590634898"/>
       </p:ext>
     </p:extLst>
   </p:cSld>
@@ -24550,185 +24355,6 @@
 </file>
 
 <file path=ppt/slides/slide7.xml><?xml version="1.0" encoding="utf-8"?>
-<p:sld xmlns:a="http://schemas.openxmlformats.org/drawingml/2006/main" xmlns:r="http://schemas.openxmlformats.org/officeDocument/2006/relationships" xmlns:p="http://schemas.openxmlformats.org/presentationml/2006/main">
-  <p:cSld>
-    <p:spTree>
-      <p:nvGrpSpPr>
-        <p:cNvPr id="1" name=""/>
-        <p:cNvGrpSpPr/>
-        <p:nvPr/>
-      </p:nvGrpSpPr>
-      <p:grpSpPr>
-        <a:xfrm>
-          <a:off x="0" y="0"/>
-          <a:ext cx="0" cy="0"/>
-          <a:chOff x="0" y="0"/>
-          <a:chExt cx="0" cy="0"/>
-        </a:xfrm>
-      </p:grpSpPr>
-      <p:sp>
-        <p:nvSpPr>
-          <p:cNvPr id="2" name="Title 1"/>
-          <p:cNvSpPr>
-            <a:spLocks noGrp="1"/>
-          </p:cNvSpPr>
-          <p:nvPr>
-            <p:ph type="title"/>
-          </p:nvPr>
-        </p:nvSpPr>
-        <p:spPr>
-          <a:xfrm>
-            <a:off x="1523968" y="0"/>
-            <a:ext cx="8986011" cy="428604"/>
-          </a:xfrm>
-        </p:spPr>
-        <p:txBody>
-          <a:bodyPr/>
-          <a:lstStyle/>
-          <a:p>
-            <a:pPr algn="ctr"/>
-            <a:r>
-              <a:rPr lang="en-GB" dirty="0" smtClean="0">
-                <a:latin typeface="+mn-lt"/>
-              </a:rPr>
-              <a:t>Malignant &amp; Benign Counts</a:t>
-            </a:r>
-            <a:endParaRPr lang="en-GB" dirty="0">
-              <a:latin typeface="+mn-lt"/>
-            </a:endParaRPr>
-          </a:p>
-        </p:txBody>
-      </p:sp>
-      <p:pic>
-        <p:nvPicPr>
-          <p:cNvPr id="1026" name="Picture 2"/>
-          <p:cNvPicPr>
-            <a:picLocks noChangeAspect="1" noChangeArrowheads="1"/>
-          </p:cNvPicPr>
-          <p:nvPr/>
-        </p:nvPicPr>
-        <p:blipFill>
-          <a:blip r:embed="rId2"/>
-          <a:srcRect/>
-          <a:stretch>
-            <a:fillRect/>
-          </a:stretch>
-        </p:blipFill>
-        <p:spPr bwMode="auto">
-          <a:xfrm>
-            <a:off x="1523968" y="571480"/>
-            <a:ext cx="8929750" cy="5643602"/>
-          </a:xfrm>
-          <a:prstGeom prst="rect">
-            <a:avLst/>
-          </a:prstGeom>
-          <a:noFill/>
-          <a:ln w="9525">
-            <a:noFill/>
-            <a:miter lim="800000"/>
-            <a:headEnd/>
-            <a:tailEnd/>
-          </a:ln>
-          <a:effectLst/>
-        </p:spPr>
-      </p:pic>
-      <p:sp>
-        <p:nvSpPr>
-          <p:cNvPr id="13" name="TextBox 12"/>
-          <p:cNvSpPr txBox="1"/>
-          <p:nvPr/>
-        </p:nvSpPr>
-        <p:spPr>
-          <a:xfrm>
-            <a:off x="4452926" y="3714752"/>
-            <a:ext cx="1143008" cy="369332"/>
-          </a:xfrm>
-          <a:prstGeom prst="rect">
-            <a:avLst/>
-          </a:prstGeom>
-          <a:noFill/>
-        </p:spPr>
-        <p:txBody>
-          <a:bodyPr wrap="square" rtlCol="0">
-            <a:spAutoFit/>
-          </a:bodyPr>
-          <a:lstStyle/>
-          <a:p>
-            <a:pPr algn="ctr"/>
-            <a:r>
-              <a:rPr lang="en-GB" dirty="0" smtClean="0">
-                <a:solidFill>
-                  <a:schemeClr val="bg1"/>
-                </a:solidFill>
-              </a:rPr>
-              <a:t>Benign</a:t>
-            </a:r>
-            <a:endParaRPr lang="en-GB" dirty="0">
-              <a:solidFill>
-                <a:schemeClr val="bg1"/>
-              </a:solidFill>
-            </a:endParaRPr>
-          </a:p>
-        </p:txBody>
-      </p:sp>
-      <p:sp>
-        <p:nvSpPr>
-          <p:cNvPr id="14" name="TextBox 13"/>
-          <p:cNvSpPr txBox="1"/>
-          <p:nvPr/>
-        </p:nvSpPr>
-        <p:spPr>
-          <a:xfrm>
-            <a:off x="7381884" y="4357694"/>
-            <a:ext cx="1143008" cy="369332"/>
-          </a:xfrm>
-          <a:prstGeom prst="rect">
-            <a:avLst/>
-          </a:prstGeom>
-          <a:noFill/>
-        </p:spPr>
-        <p:txBody>
-          <a:bodyPr wrap="square" rtlCol="0">
-            <a:spAutoFit/>
-          </a:bodyPr>
-          <a:lstStyle/>
-          <a:p>
-            <a:pPr algn="ctr"/>
-            <a:r>
-              <a:rPr lang="en-GB" dirty="0" smtClean="0">
-                <a:solidFill>
-                  <a:schemeClr val="bg1"/>
-                </a:solidFill>
-              </a:rPr>
-              <a:t>Malignant</a:t>
-            </a:r>
-            <a:endParaRPr lang="en-GB" dirty="0">
-              <a:solidFill>
-                <a:schemeClr val="bg1"/>
-              </a:solidFill>
-            </a:endParaRPr>
-          </a:p>
-        </p:txBody>
-      </p:sp>
-    </p:spTree>
-  </p:cSld>
-  <p:clrMapOvr>
-    <a:masterClrMapping/>
-  </p:clrMapOvr>
-  <p:transition spd="med">
-    <p:push/>
-  </p:transition>
-  <p:timing>
-    <p:tnLst>
-      <p:par>
-        <p:cTn id="1" dur="indefinite" restart="never" nodeType="tmRoot"/>
-      </p:par>
-    </p:tnLst>
-  </p:timing>
-</p:sld>
-</file>
-
-<file path=ppt/slides/slide8.xml><?xml version="1.0" encoding="utf-8"?>
 <p:sld xmlns:a="http://schemas.openxmlformats.org/drawingml/2006/main" xmlns:r="http://schemas.openxmlformats.org/officeDocument/2006/relationships" xmlns:p="http://schemas.openxmlformats.org/presentationml/2006/main" showMasterSp="0">
   <p:cSld>
     <p:spTree>
@@ -27478,7 +27104,7 @@
                   <a:spcPts val="40"/>
                 </a:spcBef>
               </a:pPr>
-              <a:t>8</a:t>
+              <a:t>7</a:t>
             </a:fld>
             <a:endParaRPr spc="-5" dirty="0"/>
           </a:p>
@@ -27887,7 +27513,7 @@
 </p:sld>
 </file>
 
-<file path=ppt/slides/slide9.xml><?xml version="1.0" encoding="utf-8"?>
+<file path=ppt/slides/slide8.xml><?xml version="1.0" encoding="utf-8"?>
 <p:sld xmlns:a="http://schemas.openxmlformats.org/drawingml/2006/main" xmlns:r="http://schemas.openxmlformats.org/officeDocument/2006/relationships" xmlns:p="http://schemas.openxmlformats.org/presentationml/2006/main">
   <p:cSld>
     <p:spTree>
@@ -28006,7 +27632,7 @@
                 <a:tabLst/>
                 <a:defRPr/>
               </a:pPr>
-              <a:t>9</a:t>
+              <a:t>8</a:t>
             </a:fld>
             <a:endParaRPr kumimoji="0" lang="en-GB" sz="1200" b="0" i="0" u="none" strike="noStrike" kern="1200" cap="none" spc="-5" normalizeH="0" baseline="0" noProof="0" dirty="0">
               <a:ln>
@@ -28035,7 +27661,7 @@
           <a:blip r:embed="rId2">
             <a:extLst>
               <a:ext uri="{28A0092B-C50C-407E-A947-70E740481C1C}">
-                <a14:useLocalDpi xmlns:a14="http://schemas.microsoft.com/office/drawing/2010/main" xmlns="" val="0"/>
+                <a14:useLocalDpi xmlns="" xmlns:a14="http://schemas.microsoft.com/office/drawing/2010/main" val="0"/>
               </a:ext>
             </a:extLst>
           </a:blip>
@@ -28105,6 +27731,200 @@
   </p:clrMapOvr>
   <p:transition spd="med">
     <p:wheel spokes="8"/>
+  </p:transition>
+  <p:timing>
+    <p:tnLst>
+      <p:par>
+        <p:cTn id="1" dur="indefinite" restart="never" nodeType="tmRoot"/>
+      </p:par>
+    </p:tnLst>
+  </p:timing>
+</p:sld>
+</file>
+
+<file path=ppt/slides/slide9.xml><?xml version="1.0" encoding="utf-8"?>
+<p:sld xmlns:a="http://schemas.openxmlformats.org/drawingml/2006/main" xmlns:r="http://schemas.openxmlformats.org/officeDocument/2006/relationships" xmlns:p="http://schemas.openxmlformats.org/presentationml/2006/main">
+  <p:cSld>
+    <p:spTree>
+      <p:nvGrpSpPr>
+        <p:cNvPr id="1" name=""/>
+        <p:cNvGrpSpPr/>
+        <p:nvPr/>
+      </p:nvGrpSpPr>
+      <p:grpSpPr>
+        <a:xfrm>
+          <a:off x="0" y="0"/>
+          <a:ext cx="0" cy="0"/>
+          <a:chOff x="0" y="0"/>
+          <a:chExt cx="0" cy="0"/>
+        </a:xfrm>
+      </p:grpSpPr>
+      <p:sp>
+        <p:nvSpPr>
+          <p:cNvPr id="2" name="Title 1"/>
+          <p:cNvSpPr>
+            <a:spLocks noGrp="1"/>
+          </p:cNvSpPr>
+          <p:nvPr>
+            <p:ph type="title"/>
+          </p:nvPr>
+        </p:nvSpPr>
+        <p:spPr>
+          <a:xfrm>
+            <a:off x="1523968" y="0"/>
+            <a:ext cx="8986011" cy="1077218"/>
+          </a:xfrm>
+        </p:spPr>
+        <p:txBody>
+          <a:bodyPr/>
+          <a:lstStyle/>
+          <a:p>
+            <a:pPr algn="ctr"/>
+            <a:r>
+              <a:rPr lang="en-GB" sz="3600" u="sng" spc="-5" dirty="0">
+                <a:latin typeface="+mn-lt"/>
+              </a:rPr>
+              <a:t>Classification Algorithms used for this problem</a:t>
+            </a:r>
+            <a:br>
+              <a:rPr lang="en-GB" sz="3600" u="sng" spc="-5" dirty="0">
+                <a:latin typeface="+mn-lt"/>
+              </a:rPr>
+            </a:br>
+            <a:endParaRPr lang="en-GB" dirty="0">
+              <a:latin typeface="+mn-lt"/>
+            </a:endParaRPr>
+          </a:p>
+        </p:txBody>
+      </p:sp>
+      <p:sp>
+        <p:nvSpPr>
+          <p:cNvPr id="5" name="object 5"/>
+          <p:cNvSpPr txBox="1">
+            <a:spLocks noGrp="1"/>
+          </p:cNvSpPr>
+          <p:nvPr>
+            <p:ph type="ftr" sz="quarter" idx="5"/>
+          </p:nvPr>
+        </p:nvSpPr>
+        <p:spPr>
+          <a:xfrm>
+            <a:off x="1601469" y="6620937"/>
+            <a:ext cx="1671954" cy="189796"/>
+          </a:xfrm>
+          <a:prstGeom prst="rect">
+            <a:avLst/>
+          </a:prstGeom>
+        </p:spPr>
+        <p:txBody>
+          <a:bodyPr vert="horz" wrap="square" lIns="0" tIns="5080" rIns="0" bIns="0" rtlCol="0">
+            <a:spAutoFit/>
+          </a:bodyPr>
+          <a:lstStyle/>
+          <a:p>
+            <a:pPr marL="12700">
+              <a:lnSpc>
+                <a:spcPct val="100000"/>
+              </a:lnSpc>
+              <a:spcBef>
+                <a:spcPts val="40"/>
+              </a:spcBef>
+            </a:pPr>
+            <a:r>
+              <a:rPr lang="en-GB" spc="-5" dirty="0" err="1">
+                <a:latin typeface="+mn-lt"/>
+              </a:rPr>
+              <a:t>Hemant</a:t>
+            </a:r>
+            <a:r>
+              <a:rPr lang="en-GB" spc="-5" dirty="0">
+                <a:latin typeface="+mn-lt"/>
+              </a:rPr>
+              <a:t> &amp; Jane</a:t>
+            </a:r>
+          </a:p>
+        </p:txBody>
+      </p:sp>
+      <p:sp>
+        <p:nvSpPr>
+          <p:cNvPr id="6" name="object 45"/>
+          <p:cNvSpPr txBox="1">
+            <a:spLocks noGrp="1"/>
+          </p:cNvSpPr>
+          <p:nvPr>
+            <p:ph type="sldNum" sz="quarter" idx="7"/>
+          </p:nvPr>
+        </p:nvSpPr>
+        <p:spPr>
+          <a:xfrm>
+            <a:off x="10367518" y="6620937"/>
+            <a:ext cx="244475" cy="204470"/>
+          </a:xfrm>
+          <a:prstGeom prst="rect">
+            <a:avLst/>
+          </a:prstGeom>
+        </p:spPr>
+        <p:txBody>
+          <a:bodyPr vert="horz" wrap="square" lIns="0" tIns="5080" rIns="0" bIns="0" rtlCol="0">
+            <a:spAutoFit/>
+          </a:bodyPr>
+          <a:lstStyle/>
+          <a:p>
+            <a:pPr marL="38100">
+              <a:lnSpc>
+                <a:spcPct val="100000"/>
+              </a:lnSpc>
+              <a:spcBef>
+                <a:spcPts val="40"/>
+              </a:spcBef>
+            </a:pPr>
+            <a:fld id="{81D60167-4931-47E6-BA6A-407CBD079E47}" type="slidenum">
+              <a:rPr spc="-5" dirty="0"/>
+              <a:pPr marL="38100">
+                <a:lnSpc>
+                  <a:spcPct val="100000"/>
+                </a:lnSpc>
+                <a:spcBef>
+                  <a:spcPts val="40"/>
+                </a:spcBef>
+              </a:pPr>
+              <a:t>9</a:t>
+            </a:fld>
+            <a:endParaRPr spc="-5" dirty="0"/>
+          </a:p>
+        </p:txBody>
+      </p:sp>
+      <p:pic>
+        <p:nvPicPr>
+          <p:cNvPr id="7" name="Picture 6" descr="Architecture.jpeg"/>
+          <p:cNvPicPr>
+            <a:picLocks noChangeAspect="1"/>
+          </p:cNvPicPr>
+          <p:nvPr/>
+        </p:nvPicPr>
+        <p:blipFill>
+          <a:blip r:embed="rId2"/>
+          <a:stretch>
+            <a:fillRect/>
+          </a:stretch>
+        </p:blipFill>
+        <p:spPr>
+          <a:xfrm>
+            <a:off x="1309654" y="571480"/>
+            <a:ext cx="9286940" cy="6072230"/>
+          </a:xfrm>
+          <a:prstGeom prst="rect">
+            <a:avLst/>
+          </a:prstGeom>
+        </p:spPr>
+      </p:pic>
+    </p:spTree>
+  </p:cSld>
+  <p:clrMapOvr>
+    <a:masterClrMapping/>
+  </p:clrMapOvr>
+  <p:transition spd="med">
+    <p:comb/>
   </p:transition>
   <p:timing>
     <p:tnLst>

</xml_diff>